<commit_message>
Modified design. Created html frame work. Needs improvement. Keep headers and footers as sticky elements. Reduce two columns to 100% of viewport height.
</commit_message>
<xml_diff>
--- a/Design.pptx
+++ b/Design.pptx
@@ -104,6 +104,11 @@
       </a:defRPr>
     </a:lvl9pPr>
   </p:defaultTextStyle>
+  <p:extLst>
+    <p:ext uri="{EFAFB233-063F-42B5-8137-9DF3F51BA10A}">
+      <p15:sldGuideLst xmlns:p15="http://schemas.microsoft.com/office/powerpoint/2012/main"/>
+    </p:ext>
+  </p:extLst>
 </p:presentation>
 </file>
 
@@ -240,7 +245,7 @@
           <a:p>
             <a:fld id="{BFA51706-62A2-48E5-A8AB-9BE943B198D4}" type="datetimeFigureOut">
               <a:rPr lang="en-US" smtClean="0"/>
-              <a:t>6/7/2017</a:t>
+              <a:t>7/6/2017</a:t>
             </a:fld>
             <a:endParaRPr lang="en-US"/>
           </a:p>
@@ -408,7 +413,7 @@
           <a:p>
             <a:fld id="{BFA51706-62A2-48E5-A8AB-9BE943B198D4}" type="datetimeFigureOut">
               <a:rPr lang="en-US" smtClean="0"/>
-              <a:t>6/7/2017</a:t>
+              <a:t>7/6/2017</a:t>
             </a:fld>
             <a:endParaRPr lang="en-US"/>
           </a:p>
@@ -586,7 +591,7 @@
           <a:p>
             <a:fld id="{BFA51706-62A2-48E5-A8AB-9BE943B198D4}" type="datetimeFigureOut">
               <a:rPr lang="en-US" smtClean="0"/>
-              <a:t>6/7/2017</a:t>
+              <a:t>7/6/2017</a:t>
             </a:fld>
             <a:endParaRPr lang="en-US"/>
           </a:p>
@@ -754,7 +759,7 @@
           <a:p>
             <a:fld id="{BFA51706-62A2-48E5-A8AB-9BE943B198D4}" type="datetimeFigureOut">
               <a:rPr lang="en-US" smtClean="0"/>
-              <a:t>6/7/2017</a:t>
+              <a:t>7/6/2017</a:t>
             </a:fld>
             <a:endParaRPr lang="en-US"/>
           </a:p>
@@ -999,7 +1004,7 @@
           <a:p>
             <a:fld id="{BFA51706-62A2-48E5-A8AB-9BE943B198D4}" type="datetimeFigureOut">
               <a:rPr lang="en-US" smtClean="0"/>
-              <a:t>6/7/2017</a:t>
+              <a:t>7/6/2017</a:t>
             </a:fld>
             <a:endParaRPr lang="en-US"/>
           </a:p>
@@ -1228,7 +1233,7 @@
           <a:p>
             <a:fld id="{BFA51706-62A2-48E5-A8AB-9BE943B198D4}" type="datetimeFigureOut">
               <a:rPr lang="en-US" smtClean="0"/>
-              <a:t>6/7/2017</a:t>
+              <a:t>7/6/2017</a:t>
             </a:fld>
             <a:endParaRPr lang="en-US"/>
           </a:p>
@@ -1592,7 +1597,7 @@
           <a:p>
             <a:fld id="{BFA51706-62A2-48E5-A8AB-9BE943B198D4}" type="datetimeFigureOut">
               <a:rPr lang="en-US" smtClean="0"/>
-              <a:t>6/7/2017</a:t>
+              <a:t>7/6/2017</a:t>
             </a:fld>
             <a:endParaRPr lang="en-US"/>
           </a:p>
@@ -1709,7 +1714,7 @@
           <a:p>
             <a:fld id="{BFA51706-62A2-48E5-A8AB-9BE943B198D4}" type="datetimeFigureOut">
               <a:rPr lang="en-US" smtClean="0"/>
-              <a:t>6/7/2017</a:t>
+              <a:t>7/6/2017</a:t>
             </a:fld>
             <a:endParaRPr lang="en-US"/>
           </a:p>
@@ -1804,7 +1809,7 @@
           <a:p>
             <a:fld id="{BFA51706-62A2-48E5-A8AB-9BE943B198D4}" type="datetimeFigureOut">
               <a:rPr lang="en-US" smtClean="0"/>
-              <a:t>6/7/2017</a:t>
+              <a:t>7/6/2017</a:t>
             </a:fld>
             <a:endParaRPr lang="en-US"/>
           </a:p>
@@ -2079,7 +2084,7 @@
           <a:p>
             <a:fld id="{BFA51706-62A2-48E5-A8AB-9BE943B198D4}" type="datetimeFigureOut">
               <a:rPr lang="en-US" smtClean="0"/>
-              <a:t>6/7/2017</a:t>
+              <a:t>7/6/2017</a:t>
             </a:fld>
             <a:endParaRPr lang="en-US"/>
           </a:p>
@@ -2331,7 +2336,7 @@
           <a:p>
             <a:fld id="{BFA51706-62A2-48E5-A8AB-9BE943B198D4}" type="datetimeFigureOut">
               <a:rPr lang="en-US" smtClean="0"/>
-              <a:t>6/7/2017</a:t>
+              <a:t>7/6/2017</a:t>
             </a:fld>
             <a:endParaRPr lang="en-US"/>
           </a:p>
@@ -2542,7 +2547,7 @@
           <a:p>
             <a:fld id="{BFA51706-62A2-48E5-A8AB-9BE943B198D4}" type="datetimeFigureOut">
               <a:rPr lang="en-US" smtClean="0"/>
-              <a:t>6/7/2017</a:t>
+              <a:t>7/6/2017</a:t>
             </a:fld>
             <a:endParaRPr lang="en-US"/>
           </a:p>
@@ -3003,7 +3008,7 @@
         </p:nvSpPr>
         <p:spPr>
           <a:xfrm>
-            <a:off x="2628000" y="0"/>
+            <a:off x="2620800" y="367200"/>
             <a:ext cx="8467200" cy="360000"/>
           </a:xfrm>
           <a:prstGeom prst="rect">
@@ -3160,7 +3165,7 @@
         </p:nvSpPr>
         <p:spPr>
           <a:xfrm>
-            <a:off x="2628000" y="360000"/>
+            <a:off x="2613600" y="-3600"/>
             <a:ext cx="8467200" cy="367200"/>
           </a:xfrm>
           <a:prstGeom prst="rect">

</xml_diff>